<commit_message>
fix: update provenance and profiling
</commit_message>
<xml_diff>
--- a/slides/figures.pptx
+++ b/slides/figures.pptx
@@ -5,10 +5,11 @@
     <p:sldMasterId id="2147483648" r:id="rId1"/>
   </p:sldMasterIdLst>
   <p:sldIdLst>
-    <p:sldId id="256" r:id="rId2"/>
-    <p:sldId id="257" r:id="rId3"/>
-    <p:sldId id="258" r:id="rId4"/>
-    <p:sldId id="259" r:id="rId5"/>
+    <p:sldId id="260" r:id="rId2"/>
+    <p:sldId id="256" r:id="rId3"/>
+    <p:sldId id="257" r:id="rId4"/>
+    <p:sldId id="258" r:id="rId5"/>
+    <p:sldId id="259" r:id="rId6"/>
   </p:sldIdLst>
   <p:sldSz cx="12192000" cy="6858000"/>
   <p:notesSz cx="6858000" cy="9144000"/>
@@ -117,6 +118,150 @@
 
 <file path=ppt/changesInfos/changesInfo1.xml><?xml version="1.0" encoding="utf-8"?>
 <pc:chgInfo xmlns:a="http://schemas.openxmlformats.org/drawingml/2006/main" xmlns:r="http://schemas.openxmlformats.org/officeDocument/2006/relationships" xmlns:ac="http://schemas.microsoft.com/office/drawing/2013/main/command" xmlns:pc="http://schemas.microsoft.com/office/powerpoint/2013/main/command">
+  <pc:docChgLst>
+    <pc:chgData name="Matteo Francia" userId="fbe833e6-b551-4418-a2a7-4d1023d25bd4" providerId="ADAL" clId="{311254AA-4EF9-4254-B4D7-C74A03F1F869}"/>
+    <pc:docChg chg="custSel addSld modSld sldOrd">
+      <pc:chgData name="Matteo Francia" userId="fbe833e6-b551-4418-a2a7-4d1023d25bd4" providerId="ADAL" clId="{311254AA-4EF9-4254-B4D7-C74A03F1F869}" dt="2025-10-07T06:52:38.147" v="5" actId="552"/>
+      <pc:docMkLst>
+        <pc:docMk/>
+      </pc:docMkLst>
+      <pc:sldChg chg="addSp delSp modSp new mod ord">
+        <pc:chgData name="Matteo Francia" userId="fbe833e6-b551-4418-a2a7-4d1023d25bd4" providerId="ADAL" clId="{311254AA-4EF9-4254-B4D7-C74A03F1F869}" dt="2025-10-07T06:52:38.147" v="5" actId="552"/>
+        <pc:sldMkLst>
+          <pc:docMk/>
+          <pc:sldMk cId="3489260295" sldId="260"/>
+        </pc:sldMkLst>
+        <pc:spChg chg="del">
+          <ac:chgData name="Matteo Francia" userId="fbe833e6-b551-4418-a2a7-4d1023d25bd4" providerId="ADAL" clId="{311254AA-4EF9-4254-B4D7-C74A03F1F869}" dt="2025-10-07T06:52:11.372" v="3" actId="478"/>
+          <ac:spMkLst>
+            <pc:docMk/>
+            <pc:sldMk cId="3489260295" sldId="260"/>
+            <ac:spMk id="2" creationId="{9064D62B-CDBA-4A2E-91AE-CA41601FB024}"/>
+          </ac:spMkLst>
+        </pc:spChg>
+        <pc:spChg chg="del">
+          <ac:chgData name="Matteo Francia" userId="fbe833e6-b551-4418-a2a7-4d1023d25bd4" providerId="ADAL" clId="{311254AA-4EF9-4254-B4D7-C74A03F1F869}" dt="2025-10-07T06:52:11.372" v="3" actId="478"/>
+          <ac:spMkLst>
+            <pc:docMk/>
+            <pc:sldMk cId="3489260295" sldId="260"/>
+            <ac:spMk id="3" creationId="{F8ED68B8-DC24-413A-98AD-D0C674CDB36D}"/>
+          </ac:spMkLst>
+        </pc:spChg>
+        <pc:spChg chg="add mod">
+          <ac:chgData name="Matteo Francia" userId="fbe833e6-b551-4418-a2a7-4d1023d25bd4" providerId="ADAL" clId="{311254AA-4EF9-4254-B4D7-C74A03F1F869}" dt="2025-10-07T06:52:12.410" v="4"/>
+          <ac:spMkLst>
+            <pc:docMk/>
+            <pc:sldMk cId="3489260295" sldId="260"/>
+            <ac:spMk id="4" creationId="{328B136E-0EF1-449D-B8CD-34C80C851327}"/>
+          </ac:spMkLst>
+        </pc:spChg>
+        <pc:spChg chg="add mod">
+          <ac:chgData name="Matteo Francia" userId="fbe833e6-b551-4418-a2a7-4d1023d25bd4" providerId="ADAL" clId="{311254AA-4EF9-4254-B4D7-C74A03F1F869}" dt="2025-10-07T06:52:12.410" v="4"/>
+          <ac:spMkLst>
+            <pc:docMk/>
+            <pc:sldMk cId="3489260295" sldId="260"/>
+            <ac:spMk id="5" creationId="{B59FCE38-D076-4501-BACD-903A43116EF0}"/>
+          </ac:spMkLst>
+        </pc:spChg>
+        <pc:spChg chg="add mod">
+          <ac:chgData name="Matteo Francia" userId="fbe833e6-b551-4418-a2a7-4d1023d25bd4" providerId="ADAL" clId="{311254AA-4EF9-4254-B4D7-C74A03F1F869}" dt="2025-10-07T06:52:12.410" v="4"/>
+          <ac:spMkLst>
+            <pc:docMk/>
+            <pc:sldMk cId="3489260295" sldId="260"/>
+            <ac:spMk id="6" creationId="{529CC3F4-03F9-4CEA-BB04-57E507F2EBF0}"/>
+          </ac:spMkLst>
+        </pc:spChg>
+        <pc:spChg chg="add mod">
+          <ac:chgData name="Matteo Francia" userId="fbe833e6-b551-4418-a2a7-4d1023d25bd4" providerId="ADAL" clId="{311254AA-4EF9-4254-B4D7-C74A03F1F869}" dt="2025-10-07T06:52:12.410" v="4"/>
+          <ac:spMkLst>
+            <pc:docMk/>
+            <pc:sldMk cId="3489260295" sldId="260"/>
+            <ac:spMk id="7" creationId="{0D1BCC33-7D80-43A0-AA25-FFFC022AE9EA}"/>
+          </ac:spMkLst>
+        </pc:spChg>
+        <pc:spChg chg="add mod">
+          <ac:chgData name="Matteo Francia" userId="fbe833e6-b551-4418-a2a7-4d1023d25bd4" providerId="ADAL" clId="{311254AA-4EF9-4254-B4D7-C74A03F1F869}" dt="2025-10-07T06:52:12.410" v="4"/>
+          <ac:spMkLst>
+            <pc:docMk/>
+            <pc:sldMk cId="3489260295" sldId="260"/>
+            <ac:spMk id="8" creationId="{667A2D1A-4DDC-4708-8589-DEE4A8670048}"/>
+          </ac:spMkLst>
+        </pc:spChg>
+        <pc:spChg chg="add mod">
+          <ac:chgData name="Matteo Francia" userId="fbe833e6-b551-4418-a2a7-4d1023d25bd4" providerId="ADAL" clId="{311254AA-4EF9-4254-B4D7-C74A03F1F869}" dt="2025-10-07T06:52:12.410" v="4"/>
+          <ac:spMkLst>
+            <pc:docMk/>
+            <pc:sldMk cId="3489260295" sldId="260"/>
+            <ac:spMk id="9" creationId="{C7C337A9-3F9D-450E-AF70-35E6EEF98CAF}"/>
+          </ac:spMkLst>
+        </pc:spChg>
+        <pc:spChg chg="add mod">
+          <ac:chgData name="Matteo Francia" userId="fbe833e6-b551-4418-a2a7-4d1023d25bd4" providerId="ADAL" clId="{311254AA-4EF9-4254-B4D7-C74A03F1F869}" dt="2025-10-07T06:52:12.410" v="4"/>
+          <ac:spMkLst>
+            <pc:docMk/>
+            <pc:sldMk cId="3489260295" sldId="260"/>
+            <ac:spMk id="10" creationId="{4F4BC64E-124B-4CBB-B534-23350DCFA10E}"/>
+          </ac:spMkLst>
+        </pc:spChg>
+        <pc:spChg chg="add mod">
+          <ac:chgData name="Matteo Francia" userId="fbe833e6-b551-4418-a2a7-4d1023d25bd4" providerId="ADAL" clId="{311254AA-4EF9-4254-B4D7-C74A03F1F869}" dt="2025-10-07T06:52:12.410" v="4"/>
+          <ac:spMkLst>
+            <pc:docMk/>
+            <pc:sldMk cId="3489260295" sldId="260"/>
+            <ac:spMk id="11" creationId="{4F868CD8-2C87-419A-825D-C7002355B957}"/>
+          </ac:spMkLst>
+        </pc:spChg>
+        <pc:spChg chg="add mod">
+          <ac:chgData name="Matteo Francia" userId="fbe833e6-b551-4418-a2a7-4d1023d25bd4" providerId="ADAL" clId="{311254AA-4EF9-4254-B4D7-C74A03F1F869}" dt="2025-10-07T06:52:38.147" v="5" actId="552"/>
+          <ac:spMkLst>
+            <pc:docMk/>
+            <pc:sldMk cId="3489260295" sldId="260"/>
+            <ac:spMk id="13" creationId="{6782E3DF-46B9-46A8-A8F3-B9953653CDF1}"/>
+          </ac:spMkLst>
+        </pc:spChg>
+        <pc:spChg chg="add mod">
+          <ac:chgData name="Matteo Francia" userId="fbe833e6-b551-4418-a2a7-4d1023d25bd4" providerId="ADAL" clId="{311254AA-4EF9-4254-B4D7-C74A03F1F869}" dt="2025-10-07T06:52:38.147" v="5" actId="552"/>
+          <ac:spMkLst>
+            <pc:docMk/>
+            <pc:sldMk cId="3489260295" sldId="260"/>
+            <ac:spMk id="14" creationId="{9491729C-B102-4164-A4B4-A47965957282}"/>
+          </ac:spMkLst>
+        </pc:spChg>
+        <pc:spChg chg="add mod">
+          <ac:chgData name="Matteo Francia" userId="fbe833e6-b551-4418-a2a7-4d1023d25bd4" providerId="ADAL" clId="{311254AA-4EF9-4254-B4D7-C74A03F1F869}" dt="2025-10-07T06:52:12.410" v="4"/>
+          <ac:spMkLst>
+            <pc:docMk/>
+            <pc:sldMk cId="3489260295" sldId="260"/>
+            <ac:spMk id="15" creationId="{5EEA6E57-1511-49AC-ABD8-7A5AEE76DFB4}"/>
+          </ac:spMkLst>
+        </pc:spChg>
+        <pc:spChg chg="add mod">
+          <ac:chgData name="Matteo Francia" userId="fbe833e6-b551-4418-a2a7-4d1023d25bd4" providerId="ADAL" clId="{311254AA-4EF9-4254-B4D7-C74A03F1F869}" dt="2025-10-07T06:52:12.410" v="4"/>
+          <ac:spMkLst>
+            <pc:docMk/>
+            <pc:sldMk cId="3489260295" sldId="260"/>
+            <ac:spMk id="16" creationId="{63177FD2-7A6E-4FB3-B189-9B2874A254F2}"/>
+          </ac:spMkLst>
+        </pc:spChg>
+        <pc:spChg chg="add mod">
+          <ac:chgData name="Matteo Francia" userId="fbe833e6-b551-4418-a2a7-4d1023d25bd4" providerId="ADAL" clId="{311254AA-4EF9-4254-B4D7-C74A03F1F869}" dt="2025-10-07T06:52:12.410" v="4"/>
+          <ac:spMkLst>
+            <pc:docMk/>
+            <pc:sldMk cId="3489260295" sldId="260"/>
+            <ac:spMk id="17" creationId="{A7E44423-813B-4C8C-8964-2FA85F6736C9}"/>
+          </ac:spMkLst>
+        </pc:spChg>
+        <pc:picChg chg="add mod">
+          <ac:chgData name="Matteo Francia" userId="fbe833e6-b551-4418-a2a7-4d1023d25bd4" providerId="ADAL" clId="{311254AA-4EF9-4254-B4D7-C74A03F1F869}" dt="2025-10-07T06:52:12.410" v="4"/>
+          <ac:picMkLst>
+            <pc:docMk/>
+            <pc:sldMk cId="3489260295" sldId="260"/>
+            <ac:picMk id="12" creationId="{4B569E36-E15D-4426-88C0-D7B96854281E}"/>
+          </ac:picMkLst>
+        </pc:picChg>
+      </pc:sldChg>
+    </pc:docChg>
+  </pc:docChgLst>
   <pc:docChgLst>
     <pc:chgData name="Matteo Francia" userId="fbe833e6-b551-4418-a2a7-4d1023d25bd4" providerId="ADAL" clId="{9BDAC726-A033-456D-871E-61EBD8BAEF58}"/>
     <pc:docChg chg="undo custSel addSld modSld">
@@ -3328,7 +3473,7 @@
           <a:p>
             <a:fld id="{E531EAE6-DB01-47E1-A442-261F67AA92F8}" type="datetimeFigureOut">
               <a:rPr lang="en-US" smtClean="0"/>
-              <a:t>11/11/2024</a:t>
+              <a:t>10/7/2025</a:t>
             </a:fld>
             <a:endParaRPr lang="en-US"/>
           </a:p>
@@ -3526,7 +3671,7 @@
           <a:p>
             <a:fld id="{E531EAE6-DB01-47E1-A442-261F67AA92F8}" type="datetimeFigureOut">
               <a:rPr lang="en-US" smtClean="0"/>
-              <a:t>11/11/2024</a:t>
+              <a:t>10/7/2025</a:t>
             </a:fld>
             <a:endParaRPr lang="en-US"/>
           </a:p>
@@ -3734,7 +3879,7 @@
           <a:p>
             <a:fld id="{E531EAE6-DB01-47E1-A442-261F67AA92F8}" type="datetimeFigureOut">
               <a:rPr lang="en-US" smtClean="0"/>
-              <a:t>11/11/2024</a:t>
+              <a:t>10/7/2025</a:t>
             </a:fld>
             <a:endParaRPr lang="en-US"/>
           </a:p>
@@ -3932,7 +4077,7 @@
           <a:p>
             <a:fld id="{E531EAE6-DB01-47E1-A442-261F67AA92F8}" type="datetimeFigureOut">
               <a:rPr lang="en-US" smtClean="0"/>
-              <a:t>11/11/2024</a:t>
+              <a:t>10/7/2025</a:t>
             </a:fld>
             <a:endParaRPr lang="en-US"/>
           </a:p>
@@ -4207,7 +4352,7 @@
           <a:p>
             <a:fld id="{E531EAE6-DB01-47E1-A442-261F67AA92F8}" type="datetimeFigureOut">
               <a:rPr lang="en-US" smtClean="0"/>
-              <a:t>11/11/2024</a:t>
+              <a:t>10/7/2025</a:t>
             </a:fld>
             <a:endParaRPr lang="en-US"/>
           </a:p>
@@ -4472,7 +4617,7 @@
           <a:p>
             <a:fld id="{E531EAE6-DB01-47E1-A442-261F67AA92F8}" type="datetimeFigureOut">
               <a:rPr lang="en-US" smtClean="0"/>
-              <a:t>11/11/2024</a:t>
+              <a:t>10/7/2025</a:t>
             </a:fld>
             <a:endParaRPr lang="en-US"/>
           </a:p>
@@ -4884,7 +5029,7 @@
           <a:p>
             <a:fld id="{E531EAE6-DB01-47E1-A442-261F67AA92F8}" type="datetimeFigureOut">
               <a:rPr lang="en-US" smtClean="0"/>
-              <a:t>11/11/2024</a:t>
+              <a:t>10/7/2025</a:t>
             </a:fld>
             <a:endParaRPr lang="en-US"/>
           </a:p>
@@ -5025,7 +5170,7 @@
           <a:p>
             <a:fld id="{E531EAE6-DB01-47E1-A442-261F67AA92F8}" type="datetimeFigureOut">
               <a:rPr lang="en-US" smtClean="0"/>
-              <a:t>11/11/2024</a:t>
+              <a:t>10/7/2025</a:t>
             </a:fld>
             <a:endParaRPr lang="en-US"/>
           </a:p>
@@ -5138,7 +5283,7 @@
           <a:p>
             <a:fld id="{E531EAE6-DB01-47E1-A442-261F67AA92F8}" type="datetimeFigureOut">
               <a:rPr lang="en-US" smtClean="0"/>
-              <a:t>11/11/2024</a:t>
+              <a:t>10/7/2025</a:t>
             </a:fld>
             <a:endParaRPr lang="en-US"/>
           </a:p>
@@ -5449,7 +5594,7 @@
           <a:p>
             <a:fld id="{E531EAE6-DB01-47E1-A442-261F67AA92F8}" type="datetimeFigureOut">
               <a:rPr lang="en-US" smtClean="0"/>
-              <a:t>11/11/2024</a:t>
+              <a:t>10/7/2025</a:t>
             </a:fld>
             <a:endParaRPr lang="en-US"/>
           </a:p>
@@ -5737,7 +5882,7 @@
           <a:p>
             <a:fld id="{E531EAE6-DB01-47E1-A442-261F67AA92F8}" type="datetimeFigureOut">
               <a:rPr lang="en-US" smtClean="0"/>
-              <a:t>11/11/2024</a:t>
+              <a:t>10/7/2025</a:t>
             </a:fld>
             <a:endParaRPr lang="en-US"/>
           </a:p>
@@ -5978,7 +6123,7 @@
           <a:p>
             <a:fld id="{E531EAE6-DB01-47E1-A442-261F67AA92F8}" type="datetimeFigureOut">
               <a:rPr lang="en-US" smtClean="0"/>
-              <a:t>11/11/2024</a:t>
+              <a:t>10/7/2025</a:t>
             </a:fld>
             <a:endParaRPr lang="en-US"/>
           </a:p>
@@ -6395,6 +6540,992 @@
           <a:chExt cx="0" cy="0"/>
         </a:xfrm>
       </p:grpSpPr>
+      <p:sp>
+        <p:nvSpPr>
+          <p:cNvPr id="4" name="Rettangolo 3">
+            <a:extLst>
+              <a:ext uri="{FF2B5EF4-FFF2-40B4-BE49-F238E27FC236}">
+                <a16:creationId xmlns:a16="http://schemas.microsoft.com/office/drawing/2014/main" id="{328B136E-0EF1-449D-B8CD-34C80C851327}"/>
+              </a:ext>
+            </a:extLst>
+          </p:cNvPr>
+          <p:cNvSpPr/>
+          <p:nvPr/>
+        </p:nvSpPr>
+        <p:spPr>
+          <a:xfrm>
+            <a:off x="3313404" y="1218886"/>
+            <a:ext cx="2924300" cy="2205956"/>
+          </a:xfrm>
+          <a:prstGeom prst="rect">
+            <a:avLst/>
+          </a:prstGeom>
+          <a:solidFill>
+            <a:srgbClr val="DA5354">
+              <a:alpha val="50196"/>
+            </a:srgbClr>
+          </a:solidFill>
+          <a:ln>
+            <a:solidFill>
+              <a:schemeClr val="tx1"/>
+            </a:solidFill>
+          </a:ln>
+        </p:spPr>
+        <p:style>
+          <a:lnRef idx="2">
+            <a:schemeClr val="accent1">
+              <a:shade val="50000"/>
+            </a:schemeClr>
+          </a:lnRef>
+          <a:fillRef idx="1">
+            <a:schemeClr val="accent1"/>
+          </a:fillRef>
+          <a:effectRef idx="0">
+            <a:schemeClr val="accent1"/>
+          </a:effectRef>
+          <a:fontRef idx="minor">
+            <a:schemeClr val="lt1"/>
+          </a:fontRef>
+        </p:style>
+        <p:txBody>
+          <a:bodyPr rtlCol="0" anchor="ctr"/>
+          <a:lstStyle/>
+          <a:p>
+            <a:pPr algn="ctr"/>
+            <a:r>
+              <a:rPr lang="it-IT" dirty="0">
+                <a:solidFill>
+                  <a:schemeClr val="tx1"/>
+                </a:solidFill>
+              </a:rPr>
+              <a:t>Information Systems &amp; Business Intelligence</a:t>
+            </a:r>
+          </a:p>
+          <a:p>
+            <a:pPr algn="ctr"/>
+            <a:endParaRPr lang="it-IT" dirty="0">
+              <a:solidFill>
+                <a:schemeClr val="tx1"/>
+              </a:solidFill>
+            </a:endParaRPr>
+          </a:p>
+          <a:p>
+            <a:pPr algn="ctr"/>
+            <a:endParaRPr lang="it-IT" dirty="0">
+              <a:solidFill>
+                <a:schemeClr val="tx1"/>
+              </a:solidFill>
+            </a:endParaRPr>
+          </a:p>
+          <a:p>
+            <a:pPr algn="ctr"/>
+            <a:endParaRPr lang="it-IT" dirty="0">
+              <a:solidFill>
+                <a:schemeClr val="tx1"/>
+              </a:solidFill>
+            </a:endParaRPr>
+          </a:p>
+          <a:p>
+            <a:pPr algn="ctr"/>
+            <a:endParaRPr lang="it-IT" dirty="0">
+              <a:solidFill>
+                <a:schemeClr val="tx1"/>
+              </a:solidFill>
+            </a:endParaRPr>
+          </a:p>
+          <a:p>
+            <a:pPr algn="ctr"/>
+            <a:endParaRPr lang="it-IT" dirty="0">
+              <a:solidFill>
+                <a:schemeClr val="tx1"/>
+              </a:solidFill>
+            </a:endParaRPr>
+          </a:p>
+        </p:txBody>
+      </p:sp>
+      <p:sp>
+        <p:nvSpPr>
+          <p:cNvPr id="5" name="Rettangolo 4">
+            <a:extLst>
+              <a:ext uri="{FF2B5EF4-FFF2-40B4-BE49-F238E27FC236}">
+                <a16:creationId xmlns:a16="http://schemas.microsoft.com/office/drawing/2014/main" id="{B59FCE38-D076-4501-BACD-903A43116EF0}"/>
+              </a:ext>
+            </a:extLst>
+          </p:cNvPr>
+          <p:cNvSpPr/>
+          <p:nvPr/>
+        </p:nvSpPr>
+        <p:spPr>
+          <a:xfrm>
+            <a:off x="3327288" y="3619608"/>
+            <a:ext cx="6958103" cy="2279542"/>
+          </a:xfrm>
+          <a:prstGeom prst="rect">
+            <a:avLst/>
+          </a:prstGeom>
+          <a:solidFill>
+            <a:srgbClr val="EC8B34">
+              <a:alpha val="50196"/>
+            </a:srgbClr>
+          </a:solidFill>
+          <a:ln>
+            <a:solidFill>
+              <a:schemeClr val="tx1"/>
+            </a:solidFill>
+          </a:ln>
+        </p:spPr>
+        <p:style>
+          <a:lnRef idx="2">
+            <a:schemeClr val="accent1">
+              <a:shade val="50000"/>
+            </a:schemeClr>
+          </a:lnRef>
+          <a:fillRef idx="1">
+            <a:schemeClr val="accent1"/>
+          </a:fillRef>
+          <a:effectRef idx="0">
+            <a:schemeClr val="accent1"/>
+          </a:effectRef>
+          <a:fontRef idx="minor">
+            <a:schemeClr val="lt1"/>
+          </a:fontRef>
+        </p:style>
+        <p:txBody>
+          <a:bodyPr rtlCol="0" anchor="ctr"/>
+          <a:lstStyle/>
+          <a:p>
+            <a:pPr algn="ctr"/>
+            <a:r>
+              <a:rPr lang="it-IT" dirty="0">
+                <a:solidFill>
+                  <a:schemeClr val="tx1"/>
+                </a:solidFill>
+              </a:rPr>
+              <a:t>Big Data and Cloud </a:t>
+            </a:r>
+            <a:r>
+              <a:rPr lang="it-IT" dirty="0" err="1">
+                <a:solidFill>
+                  <a:schemeClr val="tx1"/>
+                </a:solidFill>
+              </a:rPr>
+              <a:t>Platforms</a:t>
+            </a:r>
+            <a:endParaRPr lang="it-IT" dirty="0">
+              <a:solidFill>
+                <a:schemeClr val="tx1"/>
+              </a:solidFill>
+            </a:endParaRPr>
+          </a:p>
+          <a:p>
+            <a:pPr algn="ctr"/>
+            <a:endParaRPr lang="it-IT" dirty="0">
+              <a:solidFill>
+                <a:schemeClr val="tx1"/>
+              </a:solidFill>
+            </a:endParaRPr>
+          </a:p>
+          <a:p>
+            <a:pPr algn="ctr"/>
+            <a:endParaRPr lang="it-IT" dirty="0">
+              <a:solidFill>
+                <a:schemeClr val="tx1"/>
+              </a:solidFill>
+            </a:endParaRPr>
+          </a:p>
+          <a:p>
+            <a:pPr algn="ctr"/>
+            <a:endParaRPr lang="it-IT" dirty="0">
+              <a:solidFill>
+                <a:schemeClr val="tx1"/>
+              </a:solidFill>
+            </a:endParaRPr>
+          </a:p>
+          <a:p>
+            <a:pPr algn="ctr"/>
+            <a:endParaRPr lang="it-IT" dirty="0">
+              <a:solidFill>
+                <a:schemeClr val="tx1"/>
+              </a:solidFill>
+            </a:endParaRPr>
+          </a:p>
+          <a:p>
+            <a:pPr algn="ctr"/>
+            <a:endParaRPr lang="it-IT" dirty="0">
+              <a:solidFill>
+                <a:schemeClr val="tx1"/>
+              </a:solidFill>
+            </a:endParaRPr>
+          </a:p>
+          <a:p>
+            <a:pPr algn="ctr"/>
+            <a:endParaRPr lang="it-IT" dirty="0">
+              <a:solidFill>
+                <a:schemeClr val="tx1"/>
+              </a:solidFill>
+            </a:endParaRPr>
+          </a:p>
+          <a:p>
+            <a:pPr algn="ctr"/>
+            <a:endParaRPr lang="it-IT" dirty="0">
+              <a:solidFill>
+                <a:schemeClr val="tx1"/>
+              </a:solidFill>
+            </a:endParaRPr>
+          </a:p>
+        </p:txBody>
+      </p:sp>
+      <p:sp>
+        <p:nvSpPr>
+          <p:cNvPr id="6" name="Rettangolo 5">
+            <a:extLst>
+              <a:ext uri="{FF2B5EF4-FFF2-40B4-BE49-F238E27FC236}">
+                <a16:creationId xmlns:a16="http://schemas.microsoft.com/office/drawing/2014/main" id="{529CC3F4-03F9-4CEA-BB04-57E507F2EBF0}"/>
+              </a:ext>
+            </a:extLst>
+          </p:cNvPr>
+          <p:cNvSpPr/>
+          <p:nvPr/>
+        </p:nvSpPr>
+        <p:spPr>
+          <a:xfrm>
+            <a:off x="718147" y="2404333"/>
+            <a:ext cx="1949778" cy="2668636"/>
+          </a:xfrm>
+          <a:prstGeom prst="rect">
+            <a:avLst/>
+          </a:prstGeom>
+          <a:solidFill>
+            <a:srgbClr val="4C76A0">
+              <a:alpha val="50196"/>
+            </a:srgbClr>
+          </a:solidFill>
+          <a:ln>
+            <a:solidFill>
+              <a:schemeClr val="tx1"/>
+            </a:solidFill>
+          </a:ln>
+        </p:spPr>
+        <p:style>
+          <a:lnRef idx="2">
+            <a:schemeClr val="accent1">
+              <a:shade val="50000"/>
+            </a:schemeClr>
+          </a:lnRef>
+          <a:fillRef idx="1">
+            <a:schemeClr val="accent1"/>
+          </a:fillRef>
+          <a:effectRef idx="0">
+            <a:schemeClr val="accent1"/>
+          </a:effectRef>
+          <a:fontRef idx="minor">
+            <a:schemeClr val="lt1"/>
+          </a:fontRef>
+        </p:style>
+        <p:txBody>
+          <a:bodyPr rtlCol="0" anchor="ctr"/>
+          <a:lstStyle/>
+          <a:p>
+            <a:pPr algn="ctr"/>
+            <a:r>
+              <a:rPr lang="it-IT" dirty="0">
+                <a:solidFill>
+                  <a:schemeClr val="tx1"/>
+                </a:solidFill>
+              </a:rPr>
+              <a:t>Databases</a:t>
+            </a:r>
+          </a:p>
+          <a:p>
+            <a:pPr algn="ctr"/>
+            <a:endParaRPr lang="it-IT" dirty="0">
+              <a:solidFill>
+                <a:schemeClr val="tx1"/>
+              </a:solidFill>
+            </a:endParaRPr>
+          </a:p>
+          <a:p>
+            <a:pPr algn="ctr"/>
+            <a:endParaRPr lang="it-IT" dirty="0">
+              <a:solidFill>
+                <a:schemeClr val="tx1"/>
+              </a:solidFill>
+            </a:endParaRPr>
+          </a:p>
+          <a:p>
+            <a:pPr algn="ctr"/>
+            <a:endParaRPr lang="it-IT" dirty="0">
+              <a:solidFill>
+                <a:schemeClr val="tx1"/>
+              </a:solidFill>
+            </a:endParaRPr>
+          </a:p>
+          <a:p>
+            <a:pPr algn="ctr"/>
+            <a:endParaRPr lang="it-IT" dirty="0">
+              <a:solidFill>
+                <a:schemeClr val="tx1"/>
+              </a:solidFill>
+            </a:endParaRPr>
+          </a:p>
+          <a:p>
+            <a:pPr algn="ctr"/>
+            <a:endParaRPr lang="it-IT" dirty="0">
+              <a:solidFill>
+                <a:schemeClr val="tx1"/>
+              </a:solidFill>
+            </a:endParaRPr>
+          </a:p>
+          <a:p>
+            <a:pPr algn="ctr"/>
+            <a:endParaRPr lang="it-IT" dirty="0">
+              <a:solidFill>
+                <a:schemeClr val="tx1"/>
+              </a:solidFill>
+            </a:endParaRPr>
+          </a:p>
+          <a:p>
+            <a:pPr algn="ctr"/>
+            <a:endParaRPr lang="it-IT" dirty="0">
+              <a:solidFill>
+                <a:schemeClr val="tx1"/>
+              </a:solidFill>
+            </a:endParaRPr>
+          </a:p>
+        </p:txBody>
+      </p:sp>
+      <p:sp>
+        <p:nvSpPr>
+          <p:cNvPr id="7" name="Cilindro 6">
+            <a:extLst>
+              <a:ext uri="{FF2B5EF4-FFF2-40B4-BE49-F238E27FC236}">
+                <a16:creationId xmlns:a16="http://schemas.microsoft.com/office/drawing/2014/main" id="{0D1BCC33-7D80-43A0-AA25-FFFC022AE9EA}"/>
+              </a:ext>
+            </a:extLst>
+          </p:cNvPr>
+          <p:cNvSpPr/>
+          <p:nvPr/>
+        </p:nvSpPr>
+        <p:spPr>
+          <a:xfrm>
+            <a:off x="1235836" y="3173528"/>
+            <a:ext cx="914400" cy="1216152"/>
+          </a:xfrm>
+          <a:prstGeom prst="can">
+            <a:avLst/>
+          </a:prstGeom>
+          <a:ln>
+            <a:solidFill>
+              <a:schemeClr val="tx1"/>
+            </a:solidFill>
+          </a:ln>
+        </p:spPr>
+        <p:style>
+          <a:lnRef idx="2">
+            <a:schemeClr val="accent1">
+              <a:shade val="50000"/>
+            </a:schemeClr>
+          </a:lnRef>
+          <a:fillRef idx="1">
+            <a:schemeClr val="accent1"/>
+          </a:fillRef>
+          <a:effectRef idx="0">
+            <a:schemeClr val="accent1"/>
+          </a:effectRef>
+          <a:fontRef idx="minor">
+            <a:schemeClr val="lt1"/>
+          </a:fontRef>
+        </p:style>
+        <p:txBody>
+          <a:bodyPr rtlCol="0" anchor="ctr"/>
+          <a:lstStyle/>
+          <a:p>
+            <a:pPr algn="ctr"/>
+            <a:r>
+              <a:rPr lang="it-IT" sz="1300" dirty="0" err="1"/>
+              <a:t>Relational</a:t>
+            </a:r>
+            <a:r>
+              <a:rPr lang="it-IT" sz="1300" dirty="0"/>
+              <a:t> DB</a:t>
+            </a:r>
+          </a:p>
+        </p:txBody>
+      </p:sp>
+      <p:sp>
+        <p:nvSpPr>
+          <p:cNvPr id="8" name="Cilindro 7">
+            <a:extLst>
+              <a:ext uri="{FF2B5EF4-FFF2-40B4-BE49-F238E27FC236}">
+                <a16:creationId xmlns:a16="http://schemas.microsoft.com/office/drawing/2014/main" id="{667A2D1A-4DDC-4708-8589-DEE4A8670048}"/>
+              </a:ext>
+            </a:extLst>
+          </p:cNvPr>
+          <p:cNvSpPr/>
+          <p:nvPr/>
+        </p:nvSpPr>
+        <p:spPr>
+          <a:xfrm>
+            <a:off x="4460835" y="4392728"/>
+            <a:ext cx="914400" cy="1216152"/>
+          </a:xfrm>
+          <a:prstGeom prst="can">
+            <a:avLst/>
+          </a:prstGeom>
+          <a:ln>
+            <a:solidFill>
+              <a:schemeClr val="tx1"/>
+            </a:solidFill>
+          </a:ln>
+        </p:spPr>
+        <p:style>
+          <a:lnRef idx="2">
+            <a:schemeClr val="accent1">
+              <a:shade val="50000"/>
+            </a:schemeClr>
+          </a:lnRef>
+          <a:fillRef idx="1">
+            <a:schemeClr val="accent1"/>
+          </a:fillRef>
+          <a:effectRef idx="0">
+            <a:schemeClr val="accent1"/>
+          </a:effectRef>
+          <a:fontRef idx="minor">
+            <a:schemeClr val="lt1"/>
+          </a:fontRef>
+        </p:style>
+        <p:txBody>
+          <a:bodyPr rtlCol="0" anchor="ctr"/>
+          <a:lstStyle/>
+          <a:p>
+            <a:pPr algn="ctr"/>
+            <a:r>
+              <a:rPr lang="it-IT" sz="1300" dirty="0" err="1"/>
+              <a:t>NoSQL</a:t>
+            </a:r>
+            <a:r>
+              <a:rPr lang="it-IT" sz="1300" dirty="0"/>
+              <a:t> DB</a:t>
+            </a:r>
+          </a:p>
+        </p:txBody>
+      </p:sp>
+      <p:sp>
+        <p:nvSpPr>
+          <p:cNvPr id="9" name="Cilindro 8">
+            <a:extLst>
+              <a:ext uri="{FF2B5EF4-FFF2-40B4-BE49-F238E27FC236}">
+                <a16:creationId xmlns:a16="http://schemas.microsoft.com/office/drawing/2014/main" id="{C7C337A9-3F9D-450E-AF70-35E6EEF98CAF}"/>
+              </a:ext>
+            </a:extLst>
+          </p:cNvPr>
+          <p:cNvSpPr/>
+          <p:nvPr/>
+        </p:nvSpPr>
+        <p:spPr>
+          <a:xfrm>
+            <a:off x="6671616" y="4392728"/>
+            <a:ext cx="914400" cy="1216152"/>
+          </a:xfrm>
+          <a:prstGeom prst="can">
+            <a:avLst/>
+          </a:prstGeom>
+          <a:ln>
+            <a:solidFill>
+              <a:schemeClr val="tx1"/>
+            </a:solidFill>
+          </a:ln>
+        </p:spPr>
+        <p:style>
+          <a:lnRef idx="2">
+            <a:schemeClr val="accent1">
+              <a:shade val="50000"/>
+            </a:schemeClr>
+          </a:lnRef>
+          <a:fillRef idx="1">
+            <a:schemeClr val="accent1"/>
+          </a:fillRef>
+          <a:effectRef idx="0">
+            <a:schemeClr val="accent1"/>
+          </a:effectRef>
+          <a:fontRef idx="minor">
+            <a:schemeClr val="lt1"/>
+          </a:fontRef>
+        </p:style>
+        <p:txBody>
+          <a:bodyPr rtlCol="0" anchor="ctr"/>
+          <a:lstStyle/>
+          <a:p>
+            <a:pPr algn="ctr"/>
+            <a:r>
+              <a:rPr lang="it-IT" sz="1300" dirty="0"/>
+              <a:t>Data</a:t>
+            </a:r>
+            <a:br>
+              <a:rPr lang="it-IT" sz="1300" dirty="0"/>
+            </a:br>
+            <a:r>
+              <a:rPr lang="it-IT" sz="1300" dirty="0"/>
+              <a:t>Lake</a:t>
+            </a:r>
+          </a:p>
+        </p:txBody>
+      </p:sp>
+      <p:sp>
+        <p:nvSpPr>
+          <p:cNvPr id="10" name="Cilindro 9">
+            <a:extLst>
+              <a:ext uri="{FF2B5EF4-FFF2-40B4-BE49-F238E27FC236}">
+                <a16:creationId xmlns:a16="http://schemas.microsoft.com/office/drawing/2014/main" id="{4F4BC64E-124B-4CBB-B534-23350DCFA10E}"/>
+              </a:ext>
+            </a:extLst>
+          </p:cNvPr>
+          <p:cNvSpPr/>
+          <p:nvPr/>
+        </p:nvSpPr>
+        <p:spPr>
+          <a:xfrm>
+            <a:off x="8882397" y="4392728"/>
+            <a:ext cx="914400" cy="1216152"/>
+          </a:xfrm>
+          <a:prstGeom prst="can">
+            <a:avLst/>
+          </a:prstGeom>
+          <a:ln>
+            <a:solidFill>
+              <a:schemeClr val="tx1"/>
+            </a:solidFill>
+          </a:ln>
+        </p:spPr>
+        <p:style>
+          <a:lnRef idx="2">
+            <a:schemeClr val="accent1">
+              <a:shade val="50000"/>
+            </a:schemeClr>
+          </a:lnRef>
+          <a:fillRef idx="1">
+            <a:schemeClr val="accent1"/>
+          </a:fillRef>
+          <a:effectRef idx="0">
+            <a:schemeClr val="accent1"/>
+          </a:effectRef>
+          <a:fontRef idx="minor">
+            <a:schemeClr val="lt1"/>
+          </a:fontRef>
+        </p:style>
+        <p:txBody>
+          <a:bodyPr rtlCol="0" anchor="ctr"/>
+          <a:lstStyle/>
+          <a:p>
+            <a:pPr algn="ctr"/>
+            <a:r>
+              <a:rPr lang="it-IT" sz="1300" dirty="0"/>
+              <a:t>Data</a:t>
+            </a:r>
+            <a:br>
+              <a:rPr lang="it-IT" sz="1300" dirty="0"/>
+            </a:br>
+            <a:r>
+              <a:rPr lang="it-IT" sz="1300" dirty="0" err="1"/>
+              <a:t>Lakehouse</a:t>
+            </a:r>
+            <a:endParaRPr lang="it-IT" sz="1300" dirty="0"/>
+          </a:p>
+        </p:txBody>
+      </p:sp>
+      <p:sp>
+        <p:nvSpPr>
+          <p:cNvPr id="11" name="Cilindro 10">
+            <a:extLst>
+              <a:ext uri="{FF2B5EF4-FFF2-40B4-BE49-F238E27FC236}">
+                <a16:creationId xmlns:a16="http://schemas.microsoft.com/office/drawing/2014/main" id="{4F868CD8-2C87-419A-825D-C7002355B957}"/>
+              </a:ext>
+            </a:extLst>
+          </p:cNvPr>
+          <p:cNvSpPr/>
+          <p:nvPr/>
+        </p:nvSpPr>
+        <p:spPr>
+          <a:xfrm>
+            <a:off x="4318354" y="2103539"/>
+            <a:ext cx="914400" cy="1216152"/>
+          </a:xfrm>
+          <a:prstGeom prst="can">
+            <a:avLst/>
+          </a:prstGeom>
+          <a:ln>
+            <a:solidFill>
+              <a:schemeClr val="tx1"/>
+            </a:solidFill>
+          </a:ln>
+        </p:spPr>
+        <p:style>
+          <a:lnRef idx="2">
+            <a:schemeClr val="accent1">
+              <a:shade val="50000"/>
+            </a:schemeClr>
+          </a:lnRef>
+          <a:fillRef idx="1">
+            <a:schemeClr val="accent1"/>
+          </a:fillRef>
+          <a:effectRef idx="0">
+            <a:schemeClr val="accent1"/>
+          </a:effectRef>
+          <a:fontRef idx="minor">
+            <a:schemeClr val="lt1"/>
+          </a:fontRef>
+        </p:style>
+        <p:txBody>
+          <a:bodyPr rtlCol="0" anchor="ctr"/>
+          <a:lstStyle/>
+          <a:p>
+            <a:pPr algn="ctr"/>
+            <a:r>
+              <a:rPr lang="it-IT" sz="1300" dirty="0"/>
+              <a:t>DWH</a:t>
+            </a:r>
+          </a:p>
+        </p:txBody>
+      </p:sp>
+      <p:pic>
+        <p:nvPicPr>
+          <p:cNvPr id="12" name="Immagine 11">
+            <a:extLst>
+              <a:ext uri="{FF2B5EF4-FFF2-40B4-BE49-F238E27FC236}">
+                <a16:creationId xmlns:a16="http://schemas.microsoft.com/office/drawing/2014/main" id="{4B569E36-E15D-4426-88C0-D7B96854281E}"/>
+              </a:ext>
+            </a:extLst>
+          </p:cNvPr>
+          <p:cNvPicPr>
+            <a:picLocks noChangeAspect="1"/>
+          </p:cNvPicPr>
+          <p:nvPr/>
+        </p:nvPicPr>
+        <p:blipFill>
+          <a:blip r:embed="rId2"/>
+          <a:stretch>
+            <a:fillRect/>
+          </a:stretch>
+        </p:blipFill>
+        <p:spPr>
+          <a:xfrm>
+            <a:off x="-3153653" y="-1239686"/>
+            <a:ext cx="1958510" cy="3825572"/>
+          </a:xfrm>
+          <a:prstGeom prst="rect">
+            <a:avLst/>
+          </a:prstGeom>
+        </p:spPr>
+      </p:pic>
+      <p:sp>
+        <p:nvSpPr>
+          <p:cNvPr id="13" name="Freccia a destra 12">
+            <a:extLst>
+              <a:ext uri="{FF2B5EF4-FFF2-40B4-BE49-F238E27FC236}">
+                <a16:creationId xmlns:a16="http://schemas.microsoft.com/office/drawing/2014/main" id="{6782E3DF-46B9-46A8-A8F3-B9953653CDF1}"/>
+              </a:ext>
+            </a:extLst>
+          </p:cNvPr>
+          <p:cNvSpPr/>
+          <p:nvPr/>
+        </p:nvSpPr>
+        <p:spPr>
+          <a:xfrm rot="1650588">
+            <a:off x="2312858" y="4226669"/>
+            <a:ext cx="1684638" cy="484632"/>
+          </a:xfrm>
+          <a:prstGeom prst="rightArrow">
+            <a:avLst/>
+          </a:prstGeom>
+          <a:solidFill>
+            <a:schemeClr val="bg1"/>
+          </a:solidFill>
+          <a:ln>
+            <a:solidFill>
+              <a:schemeClr val="tx1"/>
+            </a:solidFill>
+          </a:ln>
+        </p:spPr>
+        <p:style>
+          <a:lnRef idx="2">
+            <a:schemeClr val="accent1">
+              <a:shade val="50000"/>
+            </a:schemeClr>
+          </a:lnRef>
+          <a:fillRef idx="1">
+            <a:schemeClr val="accent1"/>
+          </a:fillRef>
+          <a:effectRef idx="0">
+            <a:schemeClr val="accent1"/>
+          </a:effectRef>
+          <a:fontRef idx="minor">
+            <a:schemeClr val="lt1"/>
+          </a:fontRef>
+        </p:style>
+        <p:txBody>
+          <a:bodyPr rtlCol="0" anchor="ctr"/>
+          <a:lstStyle/>
+          <a:p>
+            <a:pPr algn="ctr"/>
+            <a:endParaRPr lang="it-IT"/>
+          </a:p>
+        </p:txBody>
+      </p:sp>
+      <p:sp>
+        <p:nvSpPr>
+          <p:cNvPr id="14" name="Freccia a destra 13">
+            <a:extLst>
+              <a:ext uri="{FF2B5EF4-FFF2-40B4-BE49-F238E27FC236}">
+                <a16:creationId xmlns:a16="http://schemas.microsoft.com/office/drawing/2014/main" id="{9491729C-B102-4164-A4B4-A47965957282}"/>
+              </a:ext>
+            </a:extLst>
+          </p:cNvPr>
+          <p:cNvSpPr/>
+          <p:nvPr/>
+        </p:nvSpPr>
+        <p:spPr>
+          <a:xfrm rot="20390566">
+            <a:off x="2328081" y="2859555"/>
+            <a:ext cx="1684638" cy="484632"/>
+          </a:xfrm>
+          <a:prstGeom prst="rightArrow">
+            <a:avLst/>
+          </a:prstGeom>
+          <a:solidFill>
+            <a:schemeClr val="bg1"/>
+          </a:solidFill>
+          <a:ln>
+            <a:solidFill>
+              <a:schemeClr val="tx1"/>
+            </a:solidFill>
+          </a:ln>
+        </p:spPr>
+        <p:style>
+          <a:lnRef idx="2">
+            <a:schemeClr val="accent1">
+              <a:shade val="50000"/>
+            </a:schemeClr>
+          </a:lnRef>
+          <a:fillRef idx="1">
+            <a:schemeClr val="accent1"/>
+          </a:fillRef>
+          <a:effectRef idx="0">
+            <a:schemeClr val="accent1"/>
+          </a:effectRef>
+          <a:fontRef idx="minor">
+            <a:schemeClr val="lt1"/>
+          </a:fontRef>
+        </p:style>
+        <p:txBody>
+          <a:bodyPr rtlCol="0" anchor="ctr"/>
+          <a:lstStyle/>
+          <a:p>
+            <a:pPr algn="ctr"/>
+            <a:endParaRPr lang="it-IT"/>
+          </a:p>
+        </p:txBody>
+      </p:sp>
+      <p:sp>
+        <p:nvSpPr>
+          <p:cNvPr id="15" name="Rettangolo 14">
+            <a:extLst>
+              <a:ext uri="{FF2B5EF4-FFF2-40B4-BE49-F238E27FC236}">
+                <a16:creationId xmlns:a16="http://schemas.microsoft.com/office/drawing/2014/main" id="{5EEA6E57-1511-49AC-ABD8-7A5AEE76DFB4}"/>
+              </a:ext>
+            </a:extLst>
+          </p:cNvPr>
+          <p:cNvSpPr/>
+          <p:nvPr/>
+        </p:nvSpPr>
+        <p:spPr>
+          <a:xfrm>
+            <a:off x="10621671" y="1212851"/>
+            <a:ext cx="1231900" cy="4686299"/>
+          </a:xfrm>
+          <a:prstGeom prst="rect">
+            <a:avLst/>
+          </a:prstGeom>
+          <a:solidFill>
+            <a:srgbClr val="569B50">
+              <a:alpha val="50196"/>
+            </a:srgbClr>
+          </a:solidFill>
+          <a:ln>
+            <a:solidFill>
+              <a:schemeClr val="tx1"/>
+            </a:solidFill>
+          </a:ln>
+        </p:spPr>
+        <p:style>
+          <a:lnRef idx="2">
+            <a:schemeClr val="accent1">
+              <a:shade val="50000"/>
+            </a:schemeClr>
+          </a:lnRef>
+          <a:fillRef idx="1">
+            <a:schemeClr val="accent1"/>
+          </a:fillRef>
+          <a:effectRef idx="0">
+            <a:schemeClr val="accent1"/>
+          </a:effectRef>
+          <a:fontRef idx="minor">
+            <a:schemeClr val="lt1"/>
+          </a:fontRef>
+        </p:style>
+        <p:txBody>
+          <a:bodyPr vert="vert" rtlCol="0" anchor="ctr"/>
+          <a:lstStyle/>
+          <a:p>
+            <a:pPr algn="ctr"/>
+            <a:r>
+              <a:rPr lang="it-IT" dirty="0">
+                <a:solidFill>
+                  <a:schemeClr val="tx1"/>
+                </a:solidFill>
+              </a:rPr>
+              <a:t>Data Mining and Machine Learning</a:t>
+            </a:r>
+          </a:p>
+        </p:txBody>
+      </p:sp>
+      <p:sp>
+        <p:nvSpPr>
+          <p:cNvPr id="16" name="Freccia a destra 15">
+            <a:extLst>
+              <a:ext uri="{FF2B5EF4-FFF2-40B4-BE49-F238E27FC236}">
+                <a16:creationId xmlns:a16="http://schemas.microsoft.com/office/drawing/2014/main" id="{63177FD2-7A6E-4FB3-B189-9B2874A254F2}"/>
+              </a:ext>
+            </a:extLst>
+          </p:cNvPr>
+          <p:cNvSpPr/>
+          <p:nvPr/>
+        </p:nvSpPr>
+        <p:spPr>
+          <a:xfrm>
+            <a:off x="5641247" y="4758488"/>
+            <a:ext cx="764357" cy="484632"/>
+          </a:xfrm>
+          <a:prstGeom prst="rightArrow">
+            <a:avLst/>
+          </a:prstGeom>
+          <a:solidFill>
+            <a:schemeClr val="bg1"/>
+          </a:solidFill>
+          <a:ln>
+            <a:solidFill>
+              <a:schemeClr val="tx1"/>
+            </a:solidFill>
+          </a:ln>
+        </p:spPr>
+        <p:style>
+          <a:lnRef idx="2">
+            <a:schemeClr val="accent1">
+              <a:shade val="50000"/>
+            </a:schemeClr>
+          </a:lnRef>
+          <a:fillRef idx="1">
+            <a:schemeClr val="accent1"/>
+          </a:fillRef>
+          <a:effectRef idx="0">
+            <a:schemeClr val="accent1"/>
+          </a:effectRef>
+          <a:fontRef idx="minor">
+            <a:schemeClr val="lt1"/>
+          </a:fontRef>
+        </p:style>
+        <p:txBody>
+          <a:bodyPr rtlCol="0" anchor="ctr"/>
+          <a:lstStyle/>
+          <a:p>
+            <a:pPr algn="ctr"/>
+            <a:endParaRPr lang="it-IT"/>
+          </a:p>
+        </p:txBody>
+      </p:sp>
+      <p:sp>
+        <p:nvSpPr>
+          <p:cNvPr id="17" name="Freccia a destra 16">
+            <a:extLst>
+              <a:ext uri="{FF2B5EF4-FFF2-40B4-BE49-F238E27FC236}">
+                <a16:creationId xmlns:a16="http://schemas.microsoft.com/office/drawing/2014/main" id="{A7E44423-813B-4C8C-8964-2FA85F6736C9}"/>
+              </a:ext>
+            </a:extLst>
+          </p:cNvPr>
+          <p:cNvSpPr/>
+          <p:nvPr/>
+        </p:nvSpPr>
+        <p:spPr>
+          <a:xfrm>
+            <a:off x="7852028" y="4758488"/>
+            <a:ext cx="764357" cy="484632"/>
+          </a:xfrm>
+          <a:prstGeom prst="rightArrow">
+            <a:avLst/>
+          </a:prstGeom>
+          <a:solidFill>
+            <a:schemeClr val="bg1"/>
+          </a:solidFill>
+          <a:ln>
+            <a:solidFill>
+              <a:schemeClr val="tx1"/>
+            </a:solidFill>
+          </a:ln>
+        </p:spPr>
+        <p:style>
+          <a:lnRef idx="2">
+            <a:schemeClr val="accent1">
+              <a:shade val="50000"/>
+            </a:schemeClr>
+          </a:lnRef>
+          <a:fillRef idx="1">
+            <a:schemeClr val="accent1"/>
+          </a:fillRef>
+          <a:effectRef idx="0">
+            <a:schemeClr val="accent1"/>
+          </a:effectRef>
+          <a:fontRef idx="minor">
+            <a:schemeClr val="lt1"/>
+          </a:fontRef>
+        </p:style>
+        <p:txBody>
+          <a:bodyPr rtlCol="0" anchor="ctr"/>
+          <a:lstStyle/>
+          <a:p>
+            <a:pPr algn="ctr"/>
+            <a:endParaRPr lang="it-IT"/>
+          </a:p>
+        </p:txBody>
+      </p:sp>
+    </p:spTree>
+    <p:extLst>
+      <p:ext uri="{BB962C8B-B14F-4D97-AF65-F5344CB8AC3E}">
+        <p14:creationId xmlns:p14="http://schemas.microsoft.com/office/powerpoint/2010/main" val="3489260295"/>
+      </p:ext>
+    </p:extLst>
+  </p:cSld>
+  <p:clrMapOvr>
+    <a:masterClrMapping/>
+  </p:clrMapOvr>
+</p:sld>
+</file>
+
+<file path=ppt/slides/slide2.xml><?xml version="1.0" encoding="utf-8"?>
+<p:sld xmlns:a="http://schemas.openxmlformats.org/drawingml/2006/main" xmlns:r="http://schemas.openxmlformats.org/officeDocument/2006/relationships" xmlns:p="http://schemas.openxmlformats.org/presentationml/2006/main">
+  <p:cSld>
+    <p:spTree>
+      <p:nvGrpSpPr>
+        <p:cNvPr id="1" name=""/>
+        <p:cNvGrpSpPr/>
+        <p:nvPr/>
+      </p:nvGrpSpPr>
+      <p:grpSpPr>
+        <a:xfrm>
+          <a:off x="0" y="0"/>
+          <a:ext cx="0" cy="0"/>
+          <a:chOff x="0" y="0"/>
+          <a:chExt cx="0" cy="0"/>
+        </a:xfrm>
+      </p:grpSpPr>
       <p:grpSp>
         <p:nvGrpSpPr>
           <p:cNvPr id="24" name="Group 23">
@@ -7374,7 +8505,7 @@
 </p:sld>
 </file>
 
-<file path=ppt/slides/slide2.xml><?xml version="1.0" encoding="utf-8"?>
+<file path=ppt/slides/slide3.xml><?xml version="1.0" encoding="utf-8"?>
 <p:sld xmlns:a="http://schemas.openxmlformats.org/drawingml/2006/main" xmlns:r="http://schemas.openxmlformats.org/officeDocument/2006/relationships" xmlns:p="http://schemas.openxmlformats.org/presentationml/2006/main">
   <p:cSld>
     <p:spTree>
@@ -14098,7 +15229,7 @@
 </p:sld>
 </file>
 
-<file path=ppt/slides/slide3.xml><?xml version="1.0" encoding="utf-8"?>
+<file path=ppt/slides/slide4.xml><?xml version="1.0" encoding="utf-8"?>
 <p:sld xmlns:a="http://schemas.openxmlformats.org/drawingml/2006/main" xmlns:r="http://schemas.openxmlformats.org/officeDocument/2006/relationships" xmlns:p="http://schemas.openxmlformats.org/presentationml/2006/main">
   <p:cSld>
     <p:spTree>
@@ -14995,7 +16126,7 @@
 </p:sld>
 </file>
 
-<file path=ppt/slides/slide4.xml><?xml version="1.0" encoding="utf-8"?>
+<file path=ppt/slides/slide5.xml><?xml version="1.0" encoding="utf-8"?>
 <p:sld xmlns:a="http://schemas.openxmlformats.org/drawingml/2006/main" xmlns:r="http://schemas.openxmlformats.org/officeDocument/2006/relationships" xmlns:p="http://schemas.openxmlformats.org/presentationml/2006/main">
   <p:cSld>
     <p:spTree>

</xml_diff>